<commit_message>
Finale Version der Präsentation
</commit_message>
<xml_diff>
--- a/4_Presentation/Bakery sales predictions group 5_luisa_wiebke_nina_final.pptx
+++ b/4_Presentation/Bakery sales predictions group 5_luisa_wiebke_nina_final.pptx
@@ -5,7 +5,7 @@
     <p:sldMasterId id="2147483648" r:id="rId1"/>
   </p:sldMasterIdLst>
   <p:notesMasterIdLst>
-    <p:notesMasterId r:id="rId15"/>
+    <p:notesMasterId r:id="rId16"/>
   </p:notesMasterIdLst>
   <p:sldIdLst>
     <p:sldId id="256" r:id="rId2"/>
@@ -20,7 +20,8 @@
     <p:sldId id="264" r:id="rId11"/>
     <p:sldId id="267" r:id="rId12"/>
     <p:sldId id="266" r:id="rId13"/>
-    <p:sldId id="269" r:id="rId14"/>
+    <p:sldId id="270" r:id="rId14"/>
+    <p:sldId id="269" r:id="rId15"/>
   </p:sldIdLst>
   <p:sldSz cx="12192000" cy="6858000"/>
   <p:notesSz cx="6858000" cy="9144000"/>
@@ -209,7 +210,7 @@
           <a:p>
             <a:fld id="{070FA18F-97E0-D94C-BB18-D2B5FC88D1AB}" type="datetimeFigureOut">
               <a:rPr lang="en-US" smtClean="0"/>
-              <a:t>1/8/25</a:t>
+              <a:t>1/9/25</a:t>
             </a:fld>
             <a:endParaRPr lang="en-US"/>
           </a:p>
@@ -626,7 +627,7 @@
           <a:p>
             <a:fld id="{BDFA91FE-72A7-4AA2-AB5E-C049E52D282A}" type="datetimeFigureOut">
               <a:rPr lang="en-GB" smtClean="0"/>
-              <a:t>08/01/2025</a:t>
+              <a:t>09/01/2025</a:t>
             </a:fld>
             <a:endParaRPr lang="en-GB"/>
           </a:p>
@@ -826,7 +827,7 @@
           <a:p>
             <a:fld id="{BDFA91FE-72A7-4AA2-AB5E-C049E52D282A}" type="datetimeFigureOut">
               <a:rPr lang="en-GB" smtClean="0"/>
-              <a:t>08/01/2025</a:t>
+              <a:t>09/01/2025</a:t>
             </a:fld>
             <a:endParaRPr lang="en-GB"/>
           </a:p>
@@ -1036,7 +1037,7 @@
           <a:p>
             <a:fld id="{BDFA91FE-72A7-4AA2-AB5E-C049E52D282A}" type="datetimeFigureOut">
               <a:rPr lang="en-GB" smtClean="0"/>
-              <a:t>08/01/2025</a:t>
+              <a:t>09/01/2025</a:t>
             </a:fld>
             <a:endParaRPr lang="en-GB"/>
           </a:p>
@@ -1236,7 +1237,7 @@
           <a:p>
             <a:fld id="{BDFA91FE-72A7-4AA2-AB5E-C049E52D282A}" type="datetimeFigureOut">
               <a:rPr lang="en-GB" smtClean="0"/>
-              <a:t>08/01/2025</a:t>
+              <a:t>09/01/2025</a:t>
             </a:fld>
             <a:endParaRPr lang="en-GB"/>
           </a:p>
@@ -1512,7 +1513,7 @@
           <a:p>
             <a:fld id="{BDFA91FE-72A7-4AA2-AB5E-C049E52D282A}" type="datetimeFigureOut">
               <a:rPr lang="en-GB" smtClean="0"/>
-              <a:t>08/01/2025</a:t>
+              <a:t>09/01/2025</a:t>
             </a:fld>
             <a:endParaRPr lang="en-GB"/>
           </a:p>
@@ -1780,7 +1781,7 @@
           <a:p>
             <a:fld id="{BDFA91FE-72A7-4AA2-AB5E-C049E52D282A}" type="datetimeFigureOut">
               <a:rPr lang="en-GB" smtClean="0"/>
-              <a:t>08/01/2025</a:t>
+              <a:t>09/01/2025</a:t>
             </a:fld>
             <a:endParaRPr lang="en-GB"/>
           </a:p>
@@ -2195,7 +2196,7 @@
           <a:p>
             <a:fld id="{BDFA91FE-72A7-4AA2-AB5E-C049E52D282A}" type="datetimeFigureOut">
               <a:rPr lang="en-GB" smtClean="0"/>
-              <a:t>08/01/2025</a:t>
+              <a:t>09/01/2025</a:t>
             </a:fld>
             <a:endParaRPr lang="en-GB"/>
           </a:p>
@@ -2337,7 +2338,7 @@
           <a:p>
             <a:fld id="{BDFA91FE-72A7-4AA2-AB5E-C049E52D282A}" type="datetimeFigureOut">
               <a:rPr lang="en-GB" smtClean="0"/>
-              <a:t>08/01/2025</a:t>
+              <a:t>09/01/2025</a:t>
             </a:fld>
             <a:endParaRPr lang="en-GB"/>
           </a:p>
@@ -2450,7 +2451,7 @@
           <a:p>
             <a:fld id="{BDFA91FE-72A7-4AA2-AB5E-C049E52D282A}" type="datetimeFigureOut">
               <a:rPr lang="en-GB" smtClean="0"/>
-              <a:t>08/01/2025</a:t>
+              <a:t>09/01/2025</a:t>
             </a:fld>
             <a:endParaRPr lang="en-GB"/>
           </a:p>
@@ -2763,7 +2764,7 @@
           <a:p>
             <a:fld id="{BDFA91FE-72A7-4AA2-AB5E-C049E52D282A}" type="datetimeFigureOut">
               <a:rPr lang="en-GB" smtClean="0"/>
-              <a:t>08/01/2025</a:t>
+              <a:t>09/01/2025</a:t>
             </a:fld>
             <a:endParaRPr lang="en-GB"/>
           </a:p>
@@ -3052,7 +3053,7 @@
           <a:p>
             <a:fld id="{BDFA91FE-72A7-4AA2-AB5E-C049E52D282A}" type="datetimeFigureOut">
               <a:rPr lang="en-GB" smtClean="0"/>
-              <a:t>08/01/2025</a:t>
+              <a:t>09/01/2025</a:t>
             </a:fld>
             <a:endParaRPr lang="en-GB"/>
           </a:p>
@@ -3295,7 +3296,7 @@
           <a:p>
             <a:fld id="{BDFA91FE-72A7-4AA2-AB5E-C049E52D282A}" type="datetimeFigureOut">
               <a:rPr lang="en-GB" smtClean="0"/>
-              <a:t>08/01/2025</a:t>
+              <a:t>09/01/2025</a:t>
             </a:fld>
             <a:endParaRPr lang="en-GB"/>
           </a:p>
@@ -5010,7 +5011,12 @@
             <p:ph idx="1"/>
           </p:nvPr>
         </p:nvSpPr>
-        <p:spPr/>
+        <p:spPr>
+          <a:xfrm>
+            <a:off x="7315201" y="953671"/>
+            <a:ext cx="5999921" cy="736953"/>
+          </a:xfrm>
+        </p:spPr>
         <p:txBody>
           <a:bodyPr/>
           <a:lstStyle/>
@@ -5020,58 +5026,145 @@
               <a:t>Git und Branches</a:t>
             </a:r>
           </a:p>
-          <a:p>
-            <a:r>
-              <a:rPr lang="en-US" dirty="0" err="1"/>
+        </p:txBody>
+      </p:sp>
+      <p:pic>
+        <p:nvPicPr>
+          <p:cNvPr id="5" name="Picture 4" descr="A screenshot of a computer&#10;&#10;Description automatically generated">
+            <a:extLst>
+              <a:ext uri="{FF2B5EF4-FFF2-40B4-BE49-F238E27FC236}">
+                <a16:creationId xmlns:a16="http://schemas.microsoft.com/office/drawing/2014/main" id="{5F031E3B-70E5-9A2E-F012-0181881CD683}"/>
+              </a:ext>
+            </a:extLst>
+          </p:cNvPr>
+          <p:cNvPicPr>
+            <a:picLocks noChangeAspect="1"/>
+          </p:cNvPicPr>
+          <p:nvPr/>
+        </p:nvPicPr>
+        <p:blipFill>
+          <a:blip r:embed="rId2">
+            <a:extLst>
+              <a:ext uri="{28A0092B-C50C-407E-A947-70E740481C1C}">
+                <a14:useLocalDpi xmlns:a14="http://schemas.microsoft.com/office/drawing/2010/main" val="0"/>
+              </a:ext>
+            </a:extLst>
+          </a:blip>
+          <a:srcRect b="6939"/>
+          <a:stretch/>
+        </p:blipFill>
+        <p:spPr>
+          <a:xfrm>
+            <a:off x="7315201" y="1532578"/>
+            <a:ext cx="4292723" cy="4802251"/>
+          </a:xfrm>
+          <a:prstGeom prst="rect">
+            <a:avLst/>
+          </a:prstGeom>
+        </p:spPr>
+      </p:pic>
+      <p:sp>
+        <p:nvSpPr>
+          <p:cNvPr id="6" name="TextBox 5">
+            <a:extLst>
+              <a:ext uri="{FF2B5EF4-FFF2-40B4-BE49-F238E27FC236}">
+                <a16:creationId xmlns:a16="http://schemas.microsoft.com/office/drawing/2014/main" id="{F5FC164C-B3F3-342A-2C4A-BA024DFF6C84}"/>
+              </a:ext>
+            </a:extLst>
+          </p:cNvPr>
+          <p:cNvSpPr txBox="1"/>
+          <p:nvPr/>
+        </p:nvSpPr>
+        <p:spPr>
+          <a:xfrm>
+            <a:off x="838200" y="1690624"/>
+            <a:ext cx="5901267" cy="1660968"/>
+          </a:xfrm>
+          <a:prstGeom prst="rect">
+            <a:avLst/>
+          </a:prstGeom>
+          <a:noFill/>
+        </p:spPr>
+        <p:txBody>
+          <a:bodyPr wrap="square" rtlCol="0">
+            <a:spAutoFit/>
+          </a:bodyPr>
+          <a:lstStyle/>
+          <a:p>
+            <a:pPr marL="228600" indent="-228600">
+              <a:lnSpc>
+                <a:spcPct val="90000"/>
+              </a:lnSpc>
+              <a:spcBef>
+                <a:spcPts val="1000"/>
+              </a:spcBef>
+              <a:buFont typeface="Arial" panose="020B0604020202020204" pitchFamily="34" charset="0"/>
+              <a:buChar char="•"/>
+            </a:pPr>
+            <a:r>
+              <a:rPr lang="en-US" sz="2800" dirty="0" err="1"/>
               <a:t>Fähren</a:t>
             </a:r>
             <a:r>
-              <a:rPr lang="en-US" dirty="0"/>
+              <a:rPr lang="en-US" sz="2800" dirty="0"/>
               <a:t>- und </a:t>
             </a:r>
             <a:r>
-              <a:rPr lang="en-US" dirty="0" err="1"/>
+              <a:rPr lang="en-US" sz="2800" dirty="0" err="1"/>
               <a:t>Kreuzfahrten</a:t>
             </a:r>
             <a:r>
-              <a:rPr lang="en-US" dirty="0"/>
+              <a:rPr lang="en-US" sz="2800" dirty="0"/>
               <a:t> </a:t>
             </a:r>
             <a:r>
-              <a:rPr lang="en-US" dirty="0" err="1"/>
+              <a:rPr lang="en-US" sz="2800" dirty="0" err="1"/>
               <a:t>als</a:t>
             </a:r>
             <a:r>
-              <a:rPr lang="en-US" dirty="0"/>
+              <a:rPr lang="en-US" sz="2800" dirty="0"/>
               <a:t> </a:t>
             </a:r>
             <a:r>
-              <a:rPr lang="en-US" dirty="0" err="1"/>
+              <a:rPr lang="en-US" sz="2800" dirty="0" err="1"/>
               <a:t>Variablen</a:t>
             </a:r>
-            <a:endParaRPr lang="en-US" dirty="0"/>
-          </a:p>
-          <a:p>
-            <a:r>
-              <a:rPr lang="en-US" dirty="0" err="1"/>
+            <a:endParaRPr lang="en-US" sz="2800" dirty="0"/>
+          </a:p>
+          <a:p>
+            <a:pPr marL="228600" indent="-228600">
+              <a:lnSpc>
+                <a:spcPct val="90000"/>
+              </a:lnSpc>
+              <a:spcBef>
+                <a:spcPts val="1000"/>
+              </a:spcBef>
+              <a:buFont typeface="Arial" panose="020B0604020202020204" pitchFamily="34" charset="0"/>
+              <a:buChar char="•"/>
+            </a:pPr>
+            <a:r>
+              <a:rPr lang="en-US" sz="2800" dirty="0" err="1"/>
               <a:t>Falsch</a:t>
             </a:r>
             <a:r>
-              <a:rPr lang="en-US" dirty="0"/>
+              <a:rPr lang="en-US" sz="2800" dirty="0"/>
               <a:t> </a:t>
             </a:r>
             <a:r>
-              <a:rPr lang="en-US" dirty="0" err="1"/>
+              <a:rPr lang="en-US" sz="2800" dirty="0" err="1"/>
               <a:t>formatierte</a:t>
             </a:r>
             <a:r>
-              <a:rPr lang="en-US" dirty="0"/>
+              <a:rPr lang="en-US" sz="2800" dirty="0"/>
               <a:t> </a:t>
             </a:r>
             <a:r>
-              <a:rPr lang="en-US" dirty="0" err="1"/>
+              <a:rPr lang="en-US" sz="2800" dirty="0" err="1"/>
               <a:t>Variablen</a:t>
             </a:r>
+            <a:endParaRPr lang="en-US" sz="2800" dirty="0"/>
+          </a:p>
+          <a:p>
             <a:endParaRPr lang="en-US" dirty="0"/>
           </a:p>
         </p:txBody>
@@ -5090,6 +5183,105 @@
 </file>
 
 <file path=ppt/slides/slide13.xml><?xml version="1.0" encoding="utf-8"?>
+<p:sld xmlns:a="http://schemas.openxmlformats.org/drawingml/2006/main" xmlns:r="http://schemas.openxmlformats.org/officeDocument/2006/relationships" xmlns:p="http://schemas.openxmlformats.org/presentationml/2006/main">
+  <p:cSld>
+    <p:spTree>
+      <p:nvGrpSpPr>
+        <p:cNvPr id="1" name=""/>
+        <p:cNvGrpSpPr/>
+        <p:nvPr/>
+      </p:nvGrpSpPr>
+      <p:grpSpPr>
+        <a:xfrm>
+          <a:off x="0" y="0"/>
+          <a:ext cx="0" cy="0"/>
+          <a:chOff x="0" y="0"/>
+          <a:chExt cx="0" cy="0"/>
+        </a:xfrm>
+      </p:grpSpPr>
+      <p:sp>
+        <p:nvSpPr>
+          <p:cNvPr id="2" name="Title 1">
+            <a:extLst>
+              <a:ext uri="{FF2B5EF4-FFF2-40B4-BE49-F238E27FC236}">
+                <a16:creationId xmlns:a16="http://schemas.microsoft.com/office/drawing/2014/main" id="{A98671D9-95AF-880C-4E56-AE1B9680B65A}"/>
+              </a:ext>
+            </a:extLst>
+          </p:cNvPr>
+          <p:cNvSpPr>
+            <a:spLocks noGrp="1"/>
+          </p:cNvSpPr>
+          <p:nvPr>
+            <p:ph type="title"/>
+          </p:nvPr>
+        </p:nvSpPr>
+        <p:spPr/>
+        <p:txBody>
+          <a:bodyPr/>
+          <a:lstStyle/>
+          <a:p>
+            <a:r>
+              <a:rPr lang="en-US" dirty="0" err="1"/>
+              <a:t>Analyse</a:t>
+            </a:r>
+            <a:r>
+              <a:rPr lang="en-US" dirty="0"/>
+              <a:t> der </a:t>
+            </a:r>
+            <a:r>
+              <a:rPr lang="en-US" dirty="0" err="1"/>
+              <a:t>Umsatzdaten</a:t>
+            </a:r>
+            <a:endParaRPr lang="en-US" dirty="0"/>
+          </a:p>
+        </p:txBody>
+      </p:sp>
+      <p:pic>
+        <p:nvPicPr>
+          <p:cNvPr id="4" name="Content Placeholder 3">
+            <a:extLst>
+              <a:ext uri="{FF2B5EF4-FFF2-40B4-BE49-F238E27FC236}">
+                <a16:creationId xmlns:a16="http://schemas.microsoft.com/office/drawing/2014/main" id="{6EF7B55C-3B40-03CF-1126-6CEC6E8226A4}"/>
+              </a:ext>
+            </a:extLst>
+          </p:cNvPr>
+          <p:cNvPicPr>
+            <a:picLocks noGrp="1" noChangeAspect="1"/>
+          </p:cNvPicPr>
+          <p:nvPr>
+            <p:ph idx="1"/>
+          </p:nvPr>
+        </p:nvPicPr>
+        <p:blipFill>
+          <a:blip r:embed="rId2"/>
+          <a:stretch>
+            <a:fillRect/>
+          </a:stretch>
+        </p:blipFill>
+        <p:spPr>
+          <a:xfrm>
+            <a:off x="1234937" y="1544948"/>
+            <a:ext cx="9722126" cy="4828329"/>
+          </a:xfrm>
+          <a:prstGeom prst="rect">
+            <a:avLst/>
+          </a:prstGeom>
+        </p:spPr>
+      </p:pic>
+    </p:spTree>
+    <p:extLst>
+      <p:ext uri="{BB962C8B-B14F-4D97-AF65-F5344CB8AC3E}">
+        <p14:creationId xmlns:p14="http://schemas.microsoft.com/office/powerpoint/2010/main" val="4063447920"/>
+      </p:ext>
+    </p:extLst>
+  </p:cSld>
+  <p:clrMapOvr>
+    <a:masterClrMapping/>
+  </p:clrMapOvr>
+</p:sld>
+</file>
+
+<file path=ppt/slides/slide14.xml><?xml version="1.0" encoding="utf-8"?>
 <p:sld xmlns:a="http://schemas.openxmlformats.org/drawingml/2006/main" xmlns:r="http://schemas.openxmlformats.org/officeDocument/2006/relationships" xmlns:p="http://schemas.openxmlformats.org/presentationml/2006/main">
   <p:cSld>
     <p:spTree>
@@ -5252,19 +5444,85 @@
           <a:lstStyle/>
           <a:p>
             <a:r>
+              <a:rPr lang="en-GB" dirty="0" err="1"/>
+              <a:t>Inflationsrate</a:t>
+            </a:r>
+            <a:endParaRPr lang="en-GB" dirty="0"/>
+          </a:p>
+          <a:p>
+            <a:r>
+              <a:rPr lang="en-GB" dirty="0" err="1"/>
+              <a:t>Veranstaltungen</a:t>
+            </a:r>
+            <a:r>
+              <a:rPr lang="en-GB" dirty="0"/>
+              <a:t> (</a:t>
+            </a:r>
+            <a:r>
+              <a:rPr lang="en-GB" dirty="0" err="1"/>
+              <a:t>Heimspiel</a:t>
+            </a:r>
+            <a:r>
+              <a:rPr lang="en-GB" dirty="0"/>
+              <a:t>, </a:t>
+            </a:r>
+            <a:r>
+              <a:rPr lang="en-GB" dirty="0" err="1"/>
+              <a:t>Weihnachtsmarkt</a:t>
+            </a:r>
+            <a:r>
+              <a:rPr lang="en-GB" dirty="0"/>
+              <a:t>, </a:t>
+            </a:r>
+            <a:r>
+              <a:rPr lang="en-GB" dirty="0" err="1"/>
+              <a:t>Saisonmärkte</a:t>
+            </a:r>
+            <a:r>
+              <a:rPr lang="en-GB" dirty="0"/>
+              <a:t>)</a:t>
+            </a:r>
+          </a:p>
+          <a:p>
+            <a:r>
+              <a:rPr lang="en-GB" dirty="0"/>
+              <a:t>Wetter (</a:t>
+            </a:r>
+            <a:r>
+              <a:rPr lang="en-GB" dirty="0" err="1"/>
+              <a:t>Niederschlag</a:t>
+            </a:r>
+            <a:r>
+              <a:rPr lang="en-GB" dirty="0"/>
+              <a:t>, </a:t>
+            </a:r>
+            <a:r>
+              <a:rPr lang="en-GB" dirty="0" err="1"/>
+              <a:t>prozentualer</a:t>
+            </a:r>
+            <a:r>
               <a:rPr lang="en-GB" dirty="0"/>
               <a:t> </a:t>
             </a:r>
             <a:r>
               <a:rPr lang="en-GB" dirty="0" err="1"/>
-              <a:t>Inflationsrate</a:t>
-            </a:r>
-            <a:endParaRPr lang="en-GB" dirty="0"/>
-          </a:p>
-          <a:p>
+              <a:t>Sonnenschein</a:t>
+            </a:r>
+            <a:r>
+              <a:rPr lang="en-GB" dirty="0"/>
+              <a:t>, </a:t>
+            </a:r>
             <a:r>
               <a:rPr lang="en-GB" dirty="0" err="1"/>
-              <a:t>Veranstaltungen</a:t>
+              <a:t>Schneehöhe</a:t>
+            </a:r>
+            <a:r>
+              <a:rPr lang="en-GB" dirty="0"/>
+              <a:t>, relative </a:t>
+            </a:r>
+            <a:r>
+              <a:rPr lang="en-GB" dirty="0" err="1"/>
+              <a:t>Temperaturen</a:t>
             </a:r>
             <a:r>
               <a:rPr lang="en-GB" dirty="0"/>
@@ -5272,7 +5530,7 @@
             </a:r>
             <a:r>
               <a:rPr lang="en-GB" dirty="0" err="1"/>
-              <a:t>Heimspiel</a:t>
+              <a:t>hoch</a:t>
             </a:r>
             <a:r>
               <a:rPr lang="en-GB" dirty="0"/>
@@ -5280,7 +5538,7 @@
             </a:r>
             <a:r>
               <a:rPr lang="en-GB" dirty="0" err="1"/>
-              <a:t>Weihnachtsmarkt</a:t>
+              <a:t>mittel</a:t>
             </a:r>
             <a:r>
               <a:rPr lang="en-GB" dirty="0"/>
@@ -5288,29 +5546,7 @@
             </a:r>
             <a:r>
               <a:rPr lang="en-GB" dirty="0" err="1"/>
-              <a:t>Saisonmärkte</a:t>
-            </a:r>
-            <a:r>
-              <a:rPr lang="en-GB" dirty="0"/>
-              <a:t>)</a:t>
-            </a:r>
-          </a:p>
-          <a:p>
-            <a:r>
-              <a:rPr lang="en-GB" dirty="0"/>
-              <a:t>Wetter (</a:t>
-            </a:r>
-            <a:r>
-              <a:rPr lang="en-GB" dirty="0" err="1"/>
-              <a:t>Niederschlag</a:t>
-            </a:r>
-            <a:r>
-              <a:rPr lang="en-GB" dirty="0"/>
-              <a:t>, </a:t>
-            </a:r>
-            <a:r>
-              <a:rPr lang="en-GB" dirty="0" err="1"/>
-              <a:t>prozentualer</a:t>
+              <a:t>niedrig</a:t>
             </a:r>
             <a:r>
               <a:rPr lang="en-GB" dirty="0"/>
@@ -5318,47 +5554,23 @@
             </a:r>
             <a:r>
               <a:rPr lang="en-GB" dirty="0" err="1"/>
-              <a:t>Sonnenschein</a:t>
+              <a:t>nach</a:t>
             </a:r>
             <a:r>
               <a:rPr lang="en-GB" dirty="0"/>
-              <a:t>, </a:t>
+              <a:t> der </a:t>
             </a:r>
             <a:r>
               <a:rPr lang="en-GB" dirty="0" err="1"/>
-              <a:t>Schneehöhe</a:t>
+              <a:t>jeweiligen</a:t>
             </a:r>
             <a:r>
               <a:rPr lang="en-GB" dirty="0"/>
-              <a:t>, </a:t>
+              <a:t> </a:t>
             </a:r>
             <a:r>
               <a:rPr lang="en-GB" dirty="0" err="1"/>
-              <a:t>Temperatur</a:t>
-            </a:r>
-            <a:r>
-              <a:rPr lang="en-GB" dirty="0"/>
-              <a:t> (</a:t>
-            </a:r>
-            <a:r>
-              <a:rPr lang="en-GB" dirty="0" err="1"/>
-              <a:t>hoch</a:t>
-            </a:r>
-            <a:r>
-              <a:rPr lang="en-GB" dirty="0"/>
-              <a:t>, </a:t>
-            </a:r>
-            <a:r>
-              <a:rPr lang="en-GB" dirty="0" err="1"/>
-              <a:t>mittel</a:t>
-            </a:r>
-            <a:r>
-              <a:rPr lang="en-GB" dirty="0"/>
-              <a:t>, </a:t>
-            </a:r>
-            <a:r>
-              <a:rPr lang="en-GB" dirty="0" err="1"/>
-              <a:t>niedrig</a:t>
+              <a:t>Jahreszeit</a:t>
             </a:r>
             <a:r>
               <a:rPr lang="en-GB" dirty="0"/>

</xml_diff>